<commit_message>
updates to slides for first day
</commit_message>
<xml_diff>
--- a/slides/howwebworks/img/diagrams.pptx
+++ b/slides/howwebworks/img/diagrams.pptx
@@ -289,7 +289,7 @@
           <a:p>
             <a:fld id="{89247EA3-6A00-914C-B438-6883EA61F3F8}" type="datetimeFigureOut">
               <a:rPr lang="en-US" smtClean="0"/>
-              <a:t>9/7/13</a:t>
+              <a:t>9/18/13</a:t>
             </a:fld>
             <a:endParaRPr lang="en-US"/>
           </a:p>
@@ -459,7 +459,7 @@
           <a:p>
             <a:fld id="{89247EA3-6A00-914C-B438-6883EA61F3F8}" type="datetimeFigureOut">
               <a:rPr lang="en-US" smtClean="0"/>
-              <a:t>9/7/13</a:t>
+              <a:t>9/18/13</a:t>
             </a:fld>
             <a:endParaRPr lang="en-US"/>
           </a:p>
@@ -639,7 +639,7 @@
           <a:p>
             <a:fld id="{89247EA3-6A00-914C-B438-6883EA61F3F8}" type="datetimeFigureOut">
               <a:rPr lang="en-US" smtClean="0"/>
-              <a:t>9/7/13</a:t>
+              <a:t>9/18/13</a:t>
             </a:fld>
             <a:endParaRPr lang="en-US"/>
           </a:p>
@@ -809,7 +809,7 @@
           <a:p>
             <a:fld id="{89247EA3-6A00-914C-B438-6883EA61F3F8}" type="datetimeFigureOut">
               <a:rPr lang="en-US" smtClean="0"/>
-              <a:t>9/7/13</a:t>
+              <a:t>9/18/13</a:t>
             </a:fld>
             <a:endParaRPr lang="en-US"/>
           </a:p>
@@ -1055,7 +1055,7 @@
           <a:p>
             <a:fld id="{89247EA3-6A00-914C-B438-6883EA61F3F8}" type="datetimeFigureOut">
               <a:rPr lang="en-US" smtClean="0"/>
-              <a:t>9/7/13</a:t>
+              <a:t>9/18/13</a:t>
             </a:fld>
             <a:endParaRPr lang="en-US"/>
           </a:p>
@@ -1343,7 +1343,7 @@
           <a:p>
             <a:fld id="{89247EA3-6A00-914C-B438-6883EA61F3F8}" type="datetimeFigureOut">
               <a:rPr lang="en-US" smtClean="0"/>
-              <a:t>9/7/13</a:t>
+              <a:t>9/18/13</a:t>
             </a:fld>
             <a:endParaRPr lang="en-US"/>
           </a:p>
@@ -1765,7 +1765,7 @@
           <a:p>
             <a:fld id="{89247EA3-6A00-914C-B438-6883EA61F3F8}" type="datetimeFigureOut">
               <a:rPr lang="en-US" smtClean="0"/>
-              <a:t>9/7/13</a:t>
+              <a:t>9/18/13</a:t>
             </a:fld>
             <a:endParaRPr lang="en-US"/>
           </a:p>
@@ -1883,7 +1883,7 @@
           <a:p>
             <a:fld id="{89247EA3-6A00-914C-B438-6883EA61F3F8}" type="datetimeFigureOut">
               <a:rPr lang="en-US" smtClean="0"/>
-              <a:t>9/7/13</a:t>
+              <a:t>9/18/13</a:t>
             </a:fld>
             <a:endParaRPr lang="en-US"/>
           </a:p>
@@ -1978,7 +1978,7 @@
           <a:p>
             <a:fld id="{89247EA3-6A00-914C-B438-6883EA61F3F8}" type="datetimeFigureOut">
               <a:rPr lang="en-US" smtClean="0"/>
-              <a:t>9/7/13</a:t>
+              <a:t>9/18/13</a:t>
             </a:fld>
             <a:endParaRPr lang="en-US"/>
           </a:p>
@@ -2255,7 +2255,7 @@
           <a:p>
             <a:fld id="{89247EA3-6A00-914C-B438-6883EA61F3F8}" type="datetimeFigureOut">
               <a:rPr lang="en-US" smtClean="0"/>
-              <a:t>9/7/13</a:t>
+              <a:t>9/18/13</a:t>
             </a:fld>
             <a:endParaRPr lang="en-US"/>
           </a:p>
@@ -2508,7 +2508,7 @@
           <a:p>
             <a:fld id="{89247EA3-6A00-914C-B438-6883EA61F3F8}" type="datetimeFigureOut">
               <a:rPr lang="en-US" smtClean="0"/>
-              <a:t>9/7/13</a:t>
+              <a:t>9/18/13</a:t>
             </a:fld>
             <a:endParaRPr lang="en-US"/>
           </a:p>
@@ -2721,7 +2721,7 @@
           <a:p>
             <a:fld id="{89247EA3-6A00-914C-B438-6883EA61F3F8}" type="datetimeFigureOut">
               <a:rPr lang="en-US" smtClean="0"/>
-              <a:t>9/7/13</a:t>
+              <a:t>9/18/13</a:t>
             </a:fld>
             <a:endParaRPr lang="en-US"/>
           </a:p>
@@ -3105,7 +3105,7 @@
         <p:spPr>
           <a:xfrm>
             <a:off x="1596720" y="4783053"/>
-            <a:ext cx="6527980" cy="646331"/>
+            <a:ext cx="7374612" cy="646331"/>
           </a:xfrm>
           <a:prstGeom prst="rect">
             <a:avLst/>
@@ -3147,7 +3147,7 @@
         <p:spPr>
           <a:xfrm>
             <a:off x="1596719" y="3141664"/>
-            <a:ext cx="1515026" cy="1515129"/>
+            <a:ext cx="1371600" cy="1515129"/>
           </a:xfrm>
           <a:prstGeom prst="rect">
             <a:avLst/>
@@ -3195,8 +3195,8 @@
         </p:nvSpPr>
         <p:spPr>
           <a:xfrm>
-            <a:off x="6609673" y="3141664"/>
-            <a:ext cx="1515026" cy="1515129"/>
+            <a:off x="6104664" y="3141664"/>
+            <a:ext cx="1371600" cy="1515129"/>
           </a:xfrm>
           <a:prstGeom prst="rect">
             <a:avLst/>
@@ -3244,8 +3244,8 @@
         </p:nvSpPr>
         <p:spPr>
           <a:xfrm>
-            <a:off x="3267704" y="3141664"/>
-            <a:ext cx="1515026" cy="1515129"/>
+            <a:off x="3104319" y="3141664"/>
+            <a:ext cx="1371600" cy="1515129"/>
           </a:xfrm>
           <a:prstGeom prst="rect">
             <a:avLst/>
@@ -3293,8 +3293,8 @@
         </p:nvSpPr>
         <p:spPr>
           <a:xfrm>
-            <a:off x="4938689" y="3141664"/>
-            <a:ext cx="1515026" cy="1515129"/>
+            <a:off x="4611919" y="3141664"/>
+            <a:ext cx="1371600" cy="1515129"/>
           </a:xfrm>
           <a:prstGeom prst="rect">
             <a:avLst/>
@@ -3395,6 +3395,36 @@
             <a:r>
               <a:rPr lang="en-US" dirty="0" smtClean="0"/>
               <a:t>Application</a:t>
+            </a:r>
+            <a:endParaRPr lang="en-US" dirty="0"/>
+          </a:p>
+        </p:txBody>
+      </p:sp>
+      <p:sp>
+        <p:nvSpPr>
+          <p:cNvPr id="2" name="TextBox 1"/>
+          <p:cNvSpPr txBox="1"/>
+          <p:nvPr/>
+        </p:nvSpPr>
+        <p:spPr>
+          <a:xfrm>
+            <a:off x="7567705" y="4287461"/>
+            <a:ext cx="1266242" cy="369332"/>
+          </a:xfrm>
+          <a:prstGeom prst="rect">
+            <a:avLst/>
+          </a:prstGeom>
+          <a:noFill/>
+        </p:spPr>
+        <p:txBody>
+          <a:bodyPr wrap="none" rtlCol="0">
+            <a:spAutoFit/>
+          </a:bodyPr>
+          <a:lstStyle/>
+          <a:p>
+            <a:r>
+              <a:rPr lang="en-US" dirty="0" smtClean="0"/>
+              <a:t>and more…</a:t>
             </a:r>
             <a:endParaRPr lang="en-US" dirty="0"/>
           </a:p>

</xml_diff>

<commit_message>
added diagram, not sure if it's helpful
</commit_message>
<xml_diff>
--- a/slides/howwebworks/img/diagrams.pptx
+++ b/slides/howwebworks/img/diagrams.pptx
@@ -6,7 +6,8 @@
   </p:sldMasterIdLst>
   <p:sldIdLst>
     <p:sldId id="256" r:id="rId2"/>
-    <p:sldId id="257" r:id="rId3"/>
+    <p:sldId id="258" r:id="rId3"/>
+    <p:sldId id="257" r:id="rId4"/>
   </p:sldIdLst>
   <p:sldSz cx="9144000" cy="6858000" type="screen4x3"/>
   <p:notesSz cx="6858000" cy="9144000"/>
@@ -289,7 +290,7 @@
           <a:p>
             <a:fld id="{89247EA3-6A00-914C-B438-6883EA61F3F8}" type="datetimeFigureOut">
               <a:rPr lang="en-US" smtClean="0"/>
-              <a:t>9/18/13</a:t>
+              <a:t>9/25/13</a:t>
             </a:fld>
             <a:endParaRPr lang="en-US"/>
           </a:p>
@@ -459,7 +460,7 @@
           <a:p>
             <a:fld id="{89247EA3-6A00-914C-B438-6883EA61F3F8}" type="datetimeFigureOut">
               <a:rPr lang="en-US" smtClean="0"/>
-              <a:t>9/18/13</a:t>
+              <a:t>9/25/13</a:t>
             </a:fld>
             <a:endParaRPr lang="en-US"/>
           </a:p>
@@ -639,7 +640,7 @@
           <a:p>
             <a:fld id="{89247EA3-6A00-914C-B438-6883EA61F3F8}" type="datetimeFigureOut">
               <a:rPr lang="en-US" smtClean="0"/>
-              <a:t>9/18/13</a:t>
+              <a:t>9/25/13</a:t>
             </a:fld>
             <a:endParaRPr lang="en-US"/>
           </a:p>
@@ -809,7 +810,7 @@
           <a:p>
             <a:fld id="{89247EA3-6A00-914C-B438-6883EA61F3F8}" type="datetimeFigureOut">
               <a:rPr lang="en-US" smtClean="0"/>
-              <a:t>9/18/13</a:t>
+              <a:t>9/25/13</a:t>
             </a:fld>
             <a:endParaRPr lang="en-US"/>
           </a:p>
@@ -1055,7 +1056,7 @@
           <a:p>
             <a:fld id="{89247EA3-6A00-914C-B438-6883EA61F3F8}" type="datetimeFigureOut">
               <a:rPr lang="en-US" smtClean="0"/>
-              <a:t>9/18/13</a:t>
+              <a:t>9/25/13</a:t>
             </a:fld>
             <a:endParaRPr lang="en-US"/>
           </a:p>
@@ -1343,7 +1344,7 @@
           <a:p>
             <a:fld id="{89247EA3-6A00-914C-B438-6883EA61F3F8}" type="datetimeFigureOut">
               <a:rPr lang="en-US" smtClean="0"/>
-              <a:t>9/18/13</a:t>
+              <a:t>9/25/13</a:t>
             </a:fld>
             <a:endParaRPr lang="en-US"/>
           </a:p>
@@ -1765,7 +1766,7 @@
           <a:p>
             <a:fld id="{89247EA3-6A00-914C-B438-6883EA61F3F8}" type="datetimeFigureOut">
               <a:rPr lang="en-US" smtClean="0"/>
-              <a:t>9/18/13</a:t>
+              <a:t>9/25/13</a:t>
             </a:fld>
             <a:endParaRPr lang="en-US"/>
           </a:p>
@@ -1883,7 +1884,7 @@
           <a:p>
             <a:fld id="{89247EA3-6A00-914C-B438-6883EA61F3F8}" type="datetimeFigureOut">
               <a:rPr lang="en-US" smtClean="0"/>
-              <a:t>9/18/13</a:t>
+              <a:t>9/25/13</a:t>
             </a:fld>
             <a:endParaRPr lang="en-US"/>
           </a:p>
@@ -1978,7 +1979,7 @@
           <a:p>
             <a:fld id="{89247EA3-6A00-914C-B438-6883EA61F3F8}" type="datetimeFigureOut">
               <a:rPr lang="en-US" smtClean="0"/>
-              <a:t>9/18/13</a:t>
+              <a:t>9/25/13</a:t>
             </a:fld>
             <a:endParaRPr lang="en-US"/>
           </a:p>
@@ -2255,7 +2256,7 @@
           <a:p>
             <a:fld id="{89247EA3-6A00-914C-B438-6883EA61F3F8}" type="datetimeFigureOut">
               <a:rPr lang="en-US" smtClean="0"/>
-              <a:t>9/18/13</a:t>
+              <a:t>9/25/13</a:t>
             </a:fld>
             <a:endParaRPr lang="en-US"/>
           </a:p>
@@ -2508,7 +2509,7 @@
           <a:p>
             <a:fld id="{89247EA3-6A00-914C-B438-6883EA61F3F8}" type="datetimeFigureOut">
               <a:rPr lang="en-US" smtClean="0"/>
-              <a:t>9/18/13</a:t>
+              <a:t>9/25/13</a:t>
             </a:fld>
             <a:endParaRPr lang="en-US"/>
           </a:p>
@@ -2721,7 +2722,7 @@
           <a:p>
             <a:fld id="{89247EA3-6A00-914C-B438-6883EA61F3F8}" type="datetimeFigureOut">
               <a:rPr lang="en-US" smtClean="0"/>
-              <a:t>9/18/13</a:t>
+              <a:t>9/25/13</a:t>
             </a:fld>
             <a:endParaRPr lang="en-US"/>
           </a:p>
@@ -3444,6 +3445,585 @@
 </file>
 
 <file path=ppt/slides/slide2.xml><?xml version="1.0" encoding="utf-8"?>
+<p:sld xmlns:a="http://schemas.openxmlformats.org/drawingml/2006/main" xmlns:r="http://schemas.openxmlformats.org/officeDocument/2006/relationships" xmlns:p="http://schemas.openxmlformats.org/presentationml/2006/main">
+  <p:cSld>
+    <p:spTree>
+      <p:nvGrpSpPr>
+        <p:cNvPr id="1" name=""/>
+        <p:cNvGrpSpPr/>
+        <p:nvPr/>
+      </p:nvGrpSpPr>
+      <p:grpSpPr>
+        <a:xfrm>
+          <a:off x="0" y="0"/>
+          <a:ext cx="0" cy="0"/>
+          <a:chOff x="0" y="0"/>
+          <a:chExt cx="0" cy="0"/>
+        </a:xfrm>
+      </p:grpSpPr>
+      <p:sp>
+        <p:nvSpPr>
+          <p:cNvPr id="2" name="Rectangle 1"/>
+          <p:cNvSpPr/>
+          <p:nvPr/>
+        </p:nvSpPr>
+        <p:spPr>
+          <a:xfrm>
+            <a:off x="660967" y="750138"/>
+            <a:ext cx="1522453" cy="2061206"/>
+          </a:xfrm>
+          <a:prstGeom prst="rect">
+            <a:avLst/>
+          </a:prstGeom>
+        </p:spPr>
+        <p:style>
+          <a:lnRef idx="1">
+            <a:schemeClr val="accent1"/>
+          </a:lnRef>
+          <a:fillRef idx="3">
+            <a:schemeClr val="accent1"/>
+          </a:fillRef>
+          <a:effectRef idx="2">
+            <a:schemeClr val="accent1"/>
+          </a:effectRef>
+          <a:fontRef idx="minor">
+            <a:schemeClr val="lt1"/>
+          </a:fontRef>
+        </p:style>
+        <p:txBody>
+          <a:bodyPr rtlCol="0" anchor="ctr"/>
+          <a:lstStyle/>
+          <a:p>
+            <a:pPr algn="ctr"/>
+            <a:r>
+              <a:rPr lang="en-US" dirty="0" smtClean="0"/>
+              <a:t>Web Browser</a:t>
+            </a:r>
+            <a:endParaRPr lang="en-US" dirty="0"/>
+          </a:p>
+        </p:txBody>
+      </p:sp>
+      <p:sp>
+        <p:nvSpPr>
+          <p:cNvPr id="3" name="Rectangle 2"/>
+          <p:cNvSpPr/>
+          <p:nvPr/>
+        </p:nvSpPr>
+        <p:spPr>
+          <a:xfrm>
+            <a:off x="6695233" y="750138"/>
+            <a:ext cx="1522453" cy="2061206"/>
+          </a:xfrm>
+          <a:prstGeom prst="rect">
+            <a:avLst/>
+          </a:prstGeom>
+        </p:spPr>
+        <p:style>
+          <a:lnRef idx="1">
+            <a:schemeClr val="accent1"/>
+          </a:lnRef>
+          <a:fillRef idx="3">
+            <a:schemeClr val="accent1"/>
+          </a:fillRef>
+          <a:effectRef idx="2">
+            <a:schemeClr val="accent1"/>
+          </a:effectRef>
+          <a:fontRef idx="minor">
+            <a:schemeClr val="lt1"/>
+          </a:fontRef>
+        </p:style>
+        <p:txBody>
+          <a:bodyPr rtlCol="0" anchor="ctr"/>
+          <a:lstStyle/>
+          <a:p>
+            <a:pPr algn="ctr"/>
+            <a:r>
+              <a:rPr lang="en-US" dirty="0" smtClean="0"/>
+              <a:t>Web Server</a:t>
+            </a:r>
+            <a:endParaRPr lang="en-US" dirty="0"/>
+          </a:p>
+        </p:txBody>
+      </p:sp>
+      <p:sp>
+        <p:nvSpPr>
+          <p:cNvPr id="5" name="Can 4"/>
+          <p:cNvSpPr/>
+          <p:nvPr/>
+        </p:nvSpPr>
+        <p:spPr>
+          <a:xfrm>
+            <a:off x="2385937" y="4329999"/>
+            <a:ext cx="1032297" cy="1307170"/>
+          </a:xfrm>
+          <a:prstGeom prst="can">
+            <a:avLst/>
+          </a:prstGeom>
+        </p:spPr>
+        <p:style>
+          <a:lnRef idx="1">
+            <a:schemeClr val="accent1"/>
+          </a:lnRef>
+          <a:fillRef idx="3">
+            <a:schemeClr val="accent1"/>
+          </a:fillRef>
+          <a:effectRef idx="2">
+            <a:schemeClr val="accent1"/>
+          </a:effectRef>
+          <a:fontRef idx="minor">
+            <a:schemeClr val="lt1"/>
+          </a:fontRef>
+        </p:style>
+        <p:txBody>
+          <a:bodyPr rtlCol="0" anchor="ctr"/>
+          <a:lstStyle/>
+          <a:p>
+            <a:pPr algn="ctr"/>
+            <a:r>
+              <a:rPr lang="en-US" dirty="0" smtClean="0"/>
+              <a:t>DNS</a:t>
+            </a:r>
+            <a:endParaRPr lang="en-US" dirty="0"/>
+          </a:p>
+        </p:txBody>
+      </p:sp>
+      <p:sp>
+        <p:nvSpPr>
+          <p:cNvPr id="7" name="TextBox 6"/>
+          <p:cNvSpPr txBox="1"/>
+          <p:nvPr/>
+        </p:nvSpPr>
+        <p:spPr>
+          <a:xfrm>
+            <a:off x="165316" y="3868073"/>
+            <a:ext cx="1869572" cy="523220"/>
+          </a:xfrm>
+          <a:prstGeom prst="rect">
+            <a:avLst/>
+          </a:prstGeom>
+          <a:noFill/>
+        </p:spPr>
+        <p:txBody>
+          <a:bodyPr wrap="none" rtlCol="0">
+            <a:spAutoFit/>
+          </a:bodyPr>
+          <a:lstStyle/>
+          <a:p>
+            <a:pPr algn="ctr"/>
+            <a:r>
+              <a:rPr lang="en-US" sz="1400" dirty="0" smtClean="0"/>
+              <a:t>Where is</a:t>
+            </a:r>
+          </a:p>
+          <a:p>
+            <a:pPr algn="ctr"/>
+            <a:r>
+              <a:rPr lang="en-US" sz="1400" dirty="0" smtClean="0"/>
+              <a:t>www.washington.edu?</a:t>
+            </a:r>
+            <a:endParaRPr lang="en-US" sz="1400" dirty="0"/>
+          </a:p>
+        </p:txBody>
+      </p:sp>
+      <p:sp>
+        <p:nvSpPr>
+          <p:cNvPr id="9" name="TextBox 8"/>
+          <p:cNvSpPr txBox="1"/>
+          <p:nvPr/>
+        </p:nvSpPr>
+        <p:spPr>
+          <a:xfrm>
+            <a:off x="2594931" y="3441491"/>
+            <a:ext cx="1646605" cy="369332"/>
+          </a:xfrm>
+          <a:prstGeom prst="rect">
+            <a:avLst/>
+          </a:prstGeom>
+          <a:noFill/>
+        </p:spPr>
+        <p:txBody>
+          <a:bodyPr wrap="none" rtlCol="0">
+            <a:spAutoFit/>
+          </a:bodyPr>
+          <a:lstStyle/>
+          <a:p>
+            <a:r>
+              <a:rPr lang="en-US" dirty="0"/>
+              <a:t>128.95.155.134</a:t>
+            </a:r>
+          </a:p>
+        </p:txBody>
+      </p:sp>
+      <p:sp>
+        <p:nvSpPr>
+          <p:cNvPr id="11" name="Right Arrow 10"/>
+          <p:cNvSpPr/>
+          <p:nvPr/>
+        </p:nvSpPr>
+        <p:spPr>
+          <a:xfrm>
+            <a:off x="2565858" y="943242"/>
+            <a:ext cx="3794992" cy="185677"/>
+          </a:xfrm>
+          <a:prstGeom prst="rightArrow">
+            <a:avLst/>
+          </a:prstGeom>
+        </p:spPr>
+        <p:style>
+          <a:lnRef idx="1">
+            <a:schemeClr val="accent1"/>
+          </a:lnRef>
+          <a:fillRef idx="3">
+            <a:schemeClr val="accent1"/>
+          </a:fillRef>
+          <a:effectRef idx="2">
+            <a:schemeClr val="accent1"/>
+          </a:effectRef>
+          <a:fontRef idx="minor">
+            <a:schemeClr val="lt1"/>
+          </a:fontRef>
+        </p:style>
+        <p:txBody>
+          <a:bodyPr rtlCol="0" anchor="ctr"/>
+          <a:lstStyle/>
+          <a:p>
+            <a:pPr algn="ctr"/>
+            <a:endParaRPr lang="en-US"/>
+          </a:p>
+        </p:txBody>
+      </p:sp>
+      <p:sp>
+        <p:nvSpPr>
+          <p:cNvPr id="12" name="TextBox 11"/>
+          <p:cNvSpPr txBox="1"/>
+          <p:nvPr/>
+        </p:nvSpPr>
+        <p:spPr>
+          <a:xfrm>
+            <a:off x="2684716" y="611046"/>
+            <a:ext cx="3523734" cy="369332"/>
+          </a:xfrm>
+          <a:prstGeom prst="rect">
+            <a:avLst/>
+          </a:prstGeom>
+          <a:noFill/>
+        </p:spPr>
+        <p:txBody>
+          <a:bodyPr wrap="none" rtlCol="0">
+            <a:spAutoFit/>
+          </a:bodyPr>
+          <a:lstStyle/>
+          <a:p>
+            <a:r>
+              <a:rPr lang="en-US" dirty="0" smtClean="0"/>
+              <a:t>Connect to 128.95.155.134, port 80</a:t>
+            </a:r>
+            <a:endParaRPr lang="en-US" dirty="0"/>
+          </a:p>
+        </p:txBody>
+      </p:sp>
+      <p:sp>
+        <p:nvSpPr>
+          <p:cNvPr id="14" name="Right Arrow 13"/>
+          <p:cNvSpPr/>
+          <p:nvPr/>
+        </p:nvSpPr>
+        <p:spPr>
+          <a:xfrm flipH="1">
+            <a:off x="2565858" y="1448428"/>
+            <a:ext cx="3794992" cy="185677"/>
+          </a:xfrm>
+          <a:prstGeom prst="rightArrow">
+            <a:avLst/>
+          </a:prstGeom>
+        </p:spPr>
+        <p:style>
+          <a:lnRef idx="1">
+            <a:schemeClr val="accent1"/>
+          </a:lnRef>
+          <a:fillRef idx="3">
+            <a:schemeClr val="accent1"/>
+          </a:fillRef>
+          <a:effectRef idx="2">
+            <a:schemeClr val="accent1"/>
+          </a:effectRef>
+          <a:fontRef idx="minor">
+            <a:schemeClr val="lt1"/>
+          </a:fontRef>
+        </p:style>
+        <p:txBody>
+          <a:bodyPr rtlCol="0" anchor="ctr"/>
+          <a:lstStyle/>
+          <a:p>
+            <a:pPr algn="ctr"/>
+            <a:endParaRPr lang="en-US"/>
+          </a:p>
+        </p:txBody>
+      </p:sp>
+      <p:sp>
+        <p:nvSpPr>
+          <p:cNvPr id="15" name="TextBox 14"/>
+          <p:cNvSpPr txBox="1"/>
+          <p:nvPr/>
+        </p:nvSpPr>
+        <p:spPr>
+          <a:xfrm>
+            <a:off x="3261797" y="1128919"/>
+            <a:ext cx="2369572" cy="369332"/>
+          </a:xfrm>
+          <a:prstGeom prst="rect">
+            <a:avLst/>
+          </a:prstGeom>
+          <a:noFill/>
+        </p:spPr>
+        <p:txBody>
+          <a:bodyPr wrap="none" rtlCol="0">
+            <a:spAutoFit/>
+          </a:bodyPr>
+          <a:lstStyle/>
+          <a:p>
+            <a:r>
+              <a:rPr lang="en-US" dirty="0" smtClean="0"/>
+              <a:t>OK, what do you want?</a:t>
+            </a:r>
+            <a:endParaRPr lang="en-US" dirty="0"/>
+          </a:p>
+        </p:txBody>
+      </p:sp>
+      <p:sp>
+        <p:nvSpPr>
+          <p:cNvPr id="16" name="Right Arrow 15"/>
+          <p:cNvSpPr/>
+          <p:nvPr/>
+        </p:nvSpPr>
+        <p:spPr>
+          <a:xfrm>
+            <a:off x="2565858" y="2083447"/>
+            <a:ext cx="3794992" cy="185677"/>
+          </a:xfrm>
+          <a:prstGeom prst="rightArrow">
+            <a:avLst/>
+          </a:prstGeom>
+        </p:spPr>
+        <p:style>
+          <a:lnRef idx="1">
+            <a:schemeClr val="accent1"/>
+          </a:lnRef>
+          <a:fillRef idx="3">
+            <a:schemeClr val="accent1"/>
+          </a:fillRef>
+          <a:effectRef idx="2">
+            <a:schemeClr val="accent1"/>
+          </a:effectRef>
+          <a:fontRef idx="minor">
+            <a:schemeClr val="lt1"/>
+          </a:fontRef>
+        </p:style>
+        <p:txBody>
+          <a:bodyPr rtlCol="0" anchor="ctr"/>
+          <a:lstStyle/>
+          <a:p>
+            <a:pPr algn="ctr"/>
+            <a:endParaRPr lang="en-US"/>
+          </a:p>
+        </p:txBody>
+      </p:sp>
+      <p:sp>
+        <p:nvSpPr>
+          <p:cNvPr id="17" name="TextBox 16"/>
+          <p:cNvSpPr txBox="1"/>
+          <p:nvPr/>
+        </p:nvSpPr>
+        <p:spPr>
+          <a:xfrm>
+            <a:off x="3637351" y="1751251"/>
+            <a:ext cx="1618464" cy="369332"/>
+          </a:xfrm>
+          <a:prstGeom prst="rect">
+            <a:avLst/>
+          </a:prstGeom>
+          <a:noFill/>
+        </p:spPr>
+        <p:txBody>
+          <a:bodyPr wrap="none" rtlCol="0">
+            <a:spAutoFit/>
+          </a:bodyPr>
+          <a:lstStyle/>
+          <a:p>
+            <a:r>
+              <a:rPr lang="en-US" dirty="0" smtClean="0"/>
+              <a:t>GET / HTTP/1.1</a:t>
+            </a:r>
+            <a:endParaRPr lang="en-US" dirty="0"/>
+          </a:p>
+        </p:txBody>
+      </p:sp>
+      <p:sp>
+        <p:nvSpPr>
+          <p:cNvPr id="18" name="Right Arrow 17"/>
+          <p:cNvSpPr/>
+          <p:nvPr/>
+        </p:nvSpPr>
+        <p:spPr>
+          <a:xfrm flipH="1">
+            <a:off x="2565858" y="2599486"/>
+            <a:ext cx="3794992" cy="185677"/>
+          </a:xfrm>
+          <a:prstGeom prst="rightArrow">
+            <a:avLst/>
+          </a:prstGeom>
+        </p:spPr>
+        <p:style>
+          <a:lnRef idx="1">
+            <a:schemeClr val="accent1"/>
+          </a:lnRef>
+          <a:fillRef idx="3">
+            <a:schemeClr val="accent1"/>
+          </a:fillRef>
+          <a:effectRef idx="2">
+            <a:schemeClr val="accent1"/>
+          </a:effectRef>
+          <a:fontRef idx="minor">
+            <a:schemeClr val="lt1"/>
+          </a:fontRef>
+        </p:style>
+        <p:txBody>
+          <a:bodyPr rtlCol="0" anchor="ctr"/>
+          <a:lstStyle/>
+          <a:p>
+            <a:pPr algn="ctr"/>
+            <a:endParaRPr lang="en-US"/>
+          </a:p>
+        </p:txBody>
+      </p:sp>
+      <p:sp>
+        <p:nvSpPr>
+          <p:cNvPr id="19" name="TextBox 18"/>
+          <p:cNvSpPr txBox="1"/>
+          <p:nvPr/>
+        </p:nvSpPr>
+        <p:spPr>
+          <a:xfrm>
+            <a:off x="3564089" y="2279977"/>
+            <a:ext cx="1764989" cy="369332"/>
+          </a:xfrm>
+          <a:prstGeom prst="rect">
+            <a:avLst/>
+          </a:prstGeom>
+          <a:noFill/>
+        </p:spPr>
+        <p:txBody>
+          <a:bodyPr wrap="none" rtlCol="0">
+            <a:spAutoFit/>
+          </a:bodyPr>
+          <a:lstStyle/>
+          <a:p>
+            <a:r>
+              <a:rPr lang="en-US" dirty="0" smtClean="0"/>
+              <a:t>&lt;html&gt;…&lt;/html&gt;</a:t>
+            </a:r>
+            <a:endParaRPr lang="en-US" dirty="0"/>
+          </a:p>
+        </p:txBody>
+      </p:sp>
+      <p:sp>
+        <p:nvSpPr>
+          <p:cNvPr id="21" name="Bent Arrow 20"/>
+          <p:cNvSpPr/>
+          <p:nvPr/>
+        </p:nvSpPr>
+        <p:spPr>
+          <a:xfrm flipV="1">
+            <a:off x="2034888" y="2918851"/>
+            <a:ext cx="297064" cy="1931046"/>
+          </a:xfrm>
+          <a:prstGeom prst="bentArrow">
+            <a:avLst/>
+          </a:prstGeom>
+        </p:spPr>
+        <p:style>
+          <a:lnRef idx="1">
+            <a:schemeClr val="accent1"/>
+          </a:lnRef>
+          <a:fillRef idx="3">
+            <a:schemeClr val="accent1"/>
+          </a:fillRef>
+          <a:effectRef idx="2">
+            <a:schemeClr val="accent1"/>
+          </a:effectRef>
+          <a:fontRef idx="minor">
+            <a:schemeClr val="lt1"/>
+          </a:fontRef>
+        </p:style>
+        <p:txBody>
+          <a:bodyPr rtlCol="0" anchor="ctr"/>
+          <a:lstStyle/>
+          <a:p>
+            <a:pPr algn="ctr"/>
+            <a:endParaRPr lang="en-US">
+              <a:solidFill>
+                <a:schemeClr val="tx1"/>
+              </a:solidFill>
+            </a:endParaRPr>
+          </a:p>
+        </p:txBody>
+      </p:sp>
+      <p:sp>
+        <p:nvSpPr>
+          <p:cNvPr id="22" name="Bent Arrow 21"/>
+          <p:cNvSpPr/>
+          <p:nvPr/>
+        </p:nvSpPr>
+        <p:spPr>
+          <a:xfrm flipH="1">
+            <a:off x="2216807" y="2811344"/>
+            <a:ext cx="300624" cy="1455711"/>
+          </a:xfrm>
+          <a:prstGeom prst="bentArrow">
+            <a:avLst/>
+          </a:prstGeom>
+        </p:spPr>
+        <p:style>
+          <a:lnRef idx="1">
+            <a:schemeClr val="accent1"/>
+          </a:lnRef>
+          <a:fillRef idx="3">
+            <a:schemeClr val="accent1"/>
+          </a:fillRef>
+          <a:effectRef idx="2">
+            <a:schemeClr val="accent1"/>
+          </a:effectRef>
+          <a:fontRef idx="minor">
+            <a:schemeClr val="lt1"/>
+          </a:fontRef>
+        </p:style>
+        <p:txBody>
+          <a:bodyPr rtlCol="0" anchor="ctr"/>
+          <a:lstStyle/>
+          <a:p>
+            <a:pPr algn="ctr"/>
+            <a:endParaRPr lang="en-US">
+              <a:solidFill>
+                <a:schemeClr val="tx1"/>
+              </a:solidFill>
+            </a:endParaRPr>
+          </a:p>
+        </p:txBody>
+      </p:sp>
+    </p:spTree>
+    <p:extLst>
+      <p:ext uri="{BB962C8B-B14F-4D97-AF65-F5344CB8AC3E}">
+        <p14:creationId xmlns:p14="http://schemas.microsoft.com/office/powerpoint/2010/main" val="1691530273"/>
+      </p:ext>
+    </p:extLst>
+  </p:cSld>
+  <p:clrMapOvr>
+    <a:masterClrMapping/>
+  </p:clrMapOvr>
+</p:sld>
+</file>
+
+<file path=ppt/slides/slide3.xml><?xml version="1.0" encoding="utf-8"?>
 <p:sld xmlns:a="http://schemas.openxmlformats.org/drawingml/2006/main" xmlns:r="http://schemas.openxmlformats.org/officeDocument/2006/relationships" xmlns:p="http://schemas.openxmlformats.org/presentationml/2006/main">
   <p:cSld>
     <p:spTree>

</xml_diff>